<commit_message>
Actualización Documentación Fase 1 y frontend sistema
</commit_message>
<xml_diff>
--- a/Fase 2/Evidencias Proyecto/PRESENTACION-PARCIAL 2.pptx
+++ b/Fase 2/Evidencias Proyecto/PRESENTACION-PARCIAL 2.pptx
@@ -23,6 +23,7 @@
     <p:sldId id="268" r:id="rId18"/>
     <p:sldId id="269" r:id="rId19"/>
     <p:sldId id="270" r:id="rId20"/>
+    <p:sldId id="271" r:id="rId21"/>
   </p:sldIdLst>
   <p:sldSz cy="6858000" cx="12192000"/>
   <p:notesSz cx="6858000" cy="9144000"/>
@@ -257,7 +258,7 @@
   </p:defaultTextStyle>
   <p:extLst>
     <p:ext uri="GoogleSlidesCustomDataVersion2">
-      <go:slidesCustomData xmlns:go="http://customooxmlschemas.google.com/" r:id="rId21" roundtripDataSignature="AMtx7mgpQvxdByb4EqZYhDh3g2RCMQ5tGg=="/>
+      <go:slidesCustomData xmlns:go="http://customooxmlschemas.google.com/" r:id="rId22" roundtripDataSignature="AMtx7mi3zxSuXH5W1UObH8vwwboWpdE29A=="/>
     </p:ext>
   </p:extLst>
 </p:presentation>
@@ -2310,6 +2311,10 @@
           <a:prstGeom prst="rect">
             <a:avLst/>
           </a:prstGeom>
+          <a:noFill/>
+          <a:ln>
+            <a:noFill/>
+          </a:ln>
         </p:spPr>
         <p:txBody>
           <a:bodyPr anchorCtr="0" anchor="t" bIns="45700" lIns="91425" spcFirstLastPara="1" rIns="91425" wrap="square" tIns="45700">
@@ -2318,12 +2323,16 @@
           <a:lstStyle/>
           <a:p>
             <a:pPr indent="0" lvl="0" marL="0" rtl="0" algn="l">
-              <a:spcBef>
-                <a:spcPts val="0"/>
-              </a:spcBef>
-              <a:spcAft>
-                <a:spcPts val="0"/>
-              </a:spcAft>
+              <a:lnSpc>
+                <a:spcPct val="100000"/>
+              </a:lnSpc>
+              <a:spcBef>
+                <a:spcPts val="0"/>
+              </a:spcBef>
+              <a:spcAft>
+                <a:spcPts val="0"/>
+              </a:spcAft>
+              <a:buSzPts val="1400"/>
               <a:buNone/>
             </a:pPr>
             <a:r>
@@ -2366,6 +2375,16 @@
               </a:path>
             </a:pathLst>
           </a:custGeom>
+          <a:noFill/>
+          <a:ln cap="flat" cmpd="sng" w="12700">
+            <a:solidFill>
+              <a:srgbClr val="000000"/>
+            </a:solidFill>
+            <a:prstDash val="solid"/>
+            <a:round/>
+            <a:headEnd len="sm" w="sm" type="none"/>
+            <a:tailEnd len="sm" w="sm" type="none"/>
+          </a:ln>
         </p:spPr>
       </p:sp>
     </p:spTree>
@@ -2381,7 +2400,7 @@
   <p:cSld>
     <p:spTree>
       <p:nvGrpSpPr>
-        <p:cNvPr id="204" name="Shape 204"/>
+        <p:cNvPr id="201" name="Shape 201"/>
         <p:cNvGrpSpPr/>
         <p:nvPr/>
       </p:nvGrpSpPr>
@@ -2395,7 +2414,124 @@
       </p:grpSpPr>
       <p:sp>
         <p:nvSpPr>
-          <p:cNvPr id="205" name="Google Shape;205;p34:notes"/>
+          <p:cNvPr id="202" name="Google Shape;202;g31083fedd1d_0_0:notes"/>
+          <p:cNvSpPr txBox="1"/>
+          <p:nvPr>
+            <p:ph idx="1" type="body"/>
+          </p:nvPr>
+        </p:nvSpPr>
+        <p:spPr>
+          <a:xfrm>
+            <a:off x="685800" y="4400550"/>
+            <a:ext cx="5486400" cy="3600600"/>
+          </a:xfrm>
+          <a:prstGeom prst="rect">
+            <a:avLst/>
+          </a:prstGeom>
+          <a:noFill/>
+          <a:ln>
+            <a:noFill/>
+          </a:ln>
+        </p:spPr>
+        <p:txBody>
+          <a:bodyPr anchorCtr="0" anchor="t" bIns="45700" lIns="91425" spcFirstLastPara="1" rIns="91425" wrap="square" tIns="45700">
+            <a:noAutofit/>
+          </a:bodyPr>
+          <a:lstStyle/>
+          <a:p>
+            <a:pPr indent="0" lvl="0" marL="0" rtl="0" algn="l">
+              <a:lnSpc>
+                <a:spcPct val="100000"/>
+              </a:lnSpc>
+              <a:spcBef>
+                <a:spcPts val="0"/>
+              </a:spcBef>
+              <a:spcAft>
+                <a:spcPts val="0"/>
+              </a:spcAft>
+              <a:buSzPts val="1400"/>
+              <a:buNone/>
+            </a:pPr>
+            <a:r>
+              <a:t/>
+            </a:r>
+            <a:endParaRPr/>
+          </a:p>
+        </p:txBody>
+      </p:sp>
+      <p:sp>
+        <p:nvSpPr>
+          <p:cNvPr id="203" name="Google Shape;203;g31083fedd1d_0_0:notes"/>
+          <p:cNvSpPr/>
+          <p:nvPr>
+            <p:ph idx="2" type="sldImg"/>
+          </p:nvPr>
+        </p:nvSpPr>
+        <p:spPr>
+          <a:xfrm>
+            <a:off x="685800" y="1143000"/>
+            <a:ext cx="5486400" cy="3086100"/>
+          </a:xfrm>
+          <a:custGeom>
+            <a:rect b="b" l="l" r="r" t="t"/>
+            <a:pathLst>
+              <a:path extrusionOk="0" h="120000" w="120000">
+                <a:moveTo>
+                  <a:pt x="0" y="0"/>
+                </a:moveTo>
+                <a:lnTo>
+                  <a:pt x="120000" y="0"/>
+                </a:lnTo>
+                <a:lnTo>
+                  <a:pt x="120000" y="120000"/>
+                </a:lnTo>
+                <a:lnTo>
+                  <a:pt x="0" y="120000"/>
+                </a:lnTo>
+                <a:close/>
+              </a:path>
+            </a:pathLst>
+          </a:custGeom>
+          <a:noFill/>
+          <a:ln cap="flat" cmpd="sng" w="12700">
+            <a:solidFill>
+              <a:srgbClr val="000000"/>
+            </a:solidFill>
+            <a:prstDash val="solid"/>
+            <a:round/>
+            <a:headEnd len="sm" w="sm" type="none"/>
+            <a:tailEnd len="sm" w="sm" type="none"/>
+          </a:ln>
+        </p:spPr>
+      </p:sp>
+    </p:spTree>
+  </p:cSld>
+  <p:clrMapOvr>
+    <a:masterClrMapping/>
+  </p:clrMapOvr>
+</p:notes>
+</file>
+
+<file path=ppt/notesSlides/notesSlide16.xml><?xml version="1.0" encoding="utf-8"?>
+<p:notes xmlns:a="http://schemas.openxmlformats.org/drawingml/2006/main" xmlns:r="http://schemas.openxmlformats.org/officeDocument/2006/relationships" xmlns:mc="http://schemas.openxmlformats.org/markup-compatibility/2006" xmlns:mv="urn:schemas-microsoft-com:mac:vml" xmlns:p="http://schemas.openxmlformats.org/presentationml/2006/main" xmlns:c="http://schemas.openxmlformats.org/drawingml/2006/chart" xmlns:dgm="http://schemas.openxmlformats.org/drawingml/2006/diagram" xmlns:o="urn:schemas-microsoft-com:office:office" xmlns:v="urn:schemas-microsoft-com:vml" xmlns:pvml="urn:schemas-microsoft-com:office:powerpoint" xmlns:com="http://schemas.openxmlformats.org/drawingml/2006/compatibility" xmlns:p14="http://schemas.microsoft.com/office/powerpoint/2010/main" xmlns:p15="http://schemas.microsoft.com/office/powerpoint/2012/main" xmlns:ahyp="http://schemas.microsoft.com/office/drawing/2018/hyperlinkcolor" showMasterPhAnim="0" showMasterSp="0">
+  <p:cSld>
+    <p:spTree>
+      <p:nvGrpSpPr>
+        <p:cNvPr id="207" name="Shape 207"/>
+        <p:cNvGrpSpPr/>
+        <p:nvPr/>
+      </p:nvGrpSpPr>
+      <p:grpSpPr>
+        <a:xfrm>
+          <a:off x="0" y="0"/>
+          <a:ext cx="0" cy="0"/>
+          <a:chOff x="0" y="0"/>
+          <a:chExt cx="0" cy="0"/>
+        </a:xfrm>
+      </p:grpSpPr>
+      <p:sp>
+        <p:nvSpPr>
+          <p:cNvPr id="208" name="Google Shape;208;p34:notes"/>
           <p:cNvSpPr txBox="1"/>
           <p:nvPr>
             <p:ph idx="1" type="body"/>
@@ -2442,7 +2578,7 @@
       </p:sp>
       <p:sp>
         <p:nvSpPr>
-          <p:cNvPr id="206" name="Google Shape;206;p34:notes"/>
+          <p:cNvPr id="209" name="Google Shape;209;p34:notes"/>
           <p:cNvSpPr/>
           <p:nvPr>
             <p:ph idx="2" type="sldImg"/>
@@ -2526,6 +2662,10 @@
           <a:prstGeom prst="rect">
             <a:avLst/>
           </a:prstGeom>
+          <a:noFill/>
+          <a:ln>
+            <a:noFill/>
+          </a:ln>
         </p:spPr>
         <p:txBody>
           <a:bodyPr anchorCtr="0" anchor="t" bIns="45700" lIns="91425" spcFirstLastPara="1" rIns="91425" wrap="square" tIns="45700">
@@ -2534,12 +2674,16 @@
           <a:lstStyle/>
           <a:p>
             <a:pPr indent="0" lvl="0" marL="0" rtl="0" algn="l">
-              <a:spcBef>
-                <a:spcPts val="0"/>
-              </a:spcBef>
-              <a:spcAft>
-                <a:spcPts val="0"/>
-              </a:spcAft>
+              <a:lnSpc>
+                <a:spcPct val="100000"/>
+              </a:lnSpc>
+              <a:spcBef>
+                <a:spcPts val="0"/>
+              </a:spcBef>
+              <a:spcAft>
+                <a:spcPts val="0"/>
+              </a:spcAft>
+              <a:buSzPts val="1400"/>
               <a:buNone/>
             </a:pPr>
             <a:r>
@@ -2582,6 +2726,16 @@
               </a:path>
             </a:pathLst>
           </a:custGeom>
+          <a:noFill/>
+          <a:ln cap="flat" cmpd="sng" w="12700">
+            <a:solidFill>
+              <a:srgbClr val="000000"/>
+            </a:solidFill>
+            <a:prstDash val="solid"/>
+            <a:round/>
+            <a:headEnd len="sm" w="sm" type="none"/>
+            <a:tailEnd len="sm" w="sm" type="none"/>
+          </a:ln>
         </p:spPr>
       </p:sp>
     </p:spTree>
@@ -2625,6 +2779,10 @@
           <a:prstGeom prst="rect">
             <a:avLst/>
           </a:prstGeom>
+          <a:noFill/>
+          <a:ln>
+            <a:noFill/>
+          </a:ln>
         </p:spPr>
         <p:txBody>
           <a:bodyPr anchorCtr="0" anchor="t" bIns="45700" lIns="91425" spcFirstLastPara="1" rIns="91425" wrap="square" tIns="45700">
@@ -2633,12 +2791,16 @@
           <a:lstStyle/>
           <a:p>
             <a:pPr indent="0" lvl="0" marL="0" rtl="0" algn="l">
-              <a:spcBef>
-                <a:spcPts val="0"/>
-              </a:spcBef>
-              <a:spcAft>
-                <a:spcPts val="0"/>
-              </a:spcAft>
+              <a:lnSpc>
+                <a:spcPct val="100000"/>
+              </a:lnSpc>
+              <a:spcBef>
+                <a:spcPts val="0"/>
+              </a:spcBef>
+              <a:spcAft>
+                <a:spcPts val="0"/>
+              </a:spcAft>
+              <a:buSzPts val="1400"/>
               <a:buNone/>
             </a:pPr>
             <a:r>
@@ -2681,6 +2843,16 @@
               </a:path>
             </a:pathLst>
           </a:custGeom>
+          <a:noFill/>
+          <a:ln cap="flat" cmpd="sng" w="12700">
+            <a:solidFill>
+              <a:srgbClr val="000000"/>
+            </a:solidFill>
+            <a:prstDash val="solid"/>
+            <a:round/>
+            <a:headEnd len="sm" w="sm" type="none"/>
+            <a:tailEnd len="sm" w="sm" type="none"/>
+          </a:ln>
         </p:spPr>
       </p:sp>
     </p:spTree>
@@ -2724,6 +2896,10 @@
           <a:prstGeom prst="rect">
             <a:avLst/>
           </a:prstGeom>
+          <a:noFill/>
+          <a:ln>
+            <a:noFill/>
+          </a:ln>
         </p:spPr>
         <p:txBody>
           <a:bodyPr anchorCtr="0" anchor="t" bIns="45700" lIns="91425" spcFirstLastPara="1" rIns="91425" wrap="square" tIns="45700">
@@ -2732,12 +2908,16 @@
           <a:lstStyle/>
           <a:p>
             <a:pPr indent="0" lvl="0" marL="0" rtl="0" algn="l">
-              <a:spcBef>
-                <a:spcPts val="0"/>
-              </a:spcBef>
-              <a:spcAft>
-                <a:spcPts val="0"/>
-              </a:spcAft>
+              <a:lnSpc>
+                <a:spcPct val="100000"/>
+              </a:lnSpc>
+              <a:spcBef>
+                <a:spcPts val="0"/>
+              </a:spcBef>
+              <a:spcAft>
+                <a:spcPts val="0"/>
+              </a:spcAft>
+              <a:buSzPts val="1400"/>
               <a:buNone/>
             </a:pPr>
             <a:r>
@@ -2780,6 +2960,16 @@
               </a:path>
             </a:pathLst>
           </a:custGeom>
+          <a:noFill/>
+          <a:ln cap="flat" cmpd="sng" w="12700">
+            <a:solidFill>
+              <a:srgbClr val="000000"/>
+            </a:solidFill>
+            <a:prstDash val="solid"/>
+            <a:round/>
+            <a:headEnd len="sm" w="sm" type="none"/>
+            <a:tailEnd len="sm" w="sm" type="none"/>
+          </a:ln>
         </p:spPr>
       </p:sp>
     </p:spTree>
@@ -2823,6 +3013,10 @@
           <a:prstGeom prst="rect">
             <a:avLst/>
           </a:prstGeom>
+          <a:noFill/>
+          <a:ln>
+            <a:noFill/>
+          </a:ln>
         </p:spPr>
         <p:txBody>
           <a:bodyPr anchorCtr="0" anchor="t" bIns="45700" lIns="91425" spcFirstLastPara="1" rIns="91425" wrap="square" tIns="45700">
@@ -2831,12 +3025,16 @@
           <a:lstStyle/>
           <a:p>
             <a:pPr indent="0" lvl="0" marL="0" rtl="0" algn="l">
-              <a:spcBef>
-                <a:spcPts val="0"/>
-              </a:spcBef>
-              <a:spcAft>
-                <a:spcPts val="0"/>
-              </a:spcAft>
+              <a:lnSpc>
+                <a:spcPct val="100000"/>
+              </a:lnSpc>
+              <a:spcBef>
+                <a:spcPts val="0"/>
+              </a:spcBef>
+              <a:spcAft>
+                <a:spcPts val="0"/>
+              </a:spcAft>
+              <a:buSzPts val="1400"/>
               <a:buNone/>
             </a:pPr>
             <a:r>
@@ -2879,6 +3077,16 @@
               </a:path>
             </a:pathLst>
           </a:custGeom>
+          <a:noFill/>
+          <a:ln cap="flat" cmpd="sng" w="12700">
+            <a:solidFill>
+              <a:srgbClr val="000000"/>
+            </a:solidFill>
+            <a:prstDash val="solid"/>
+            <a:round/>
+            <a:headEnd len="sm" w="sm" type="none"/>
+            <a:tailEnd len="sm" w="sm" type="none"/>
+          </a:ln>
         </p:spPr>
       </p:sp>
     </p:spTree>
@@ -3040,6 +3248,10 @@
           <a:prstGeom prst="rect">
             <a:avLst/>
           </a:prstGeom>
+          <a:noFill/>
+          <a:ln>
+            <a:noFill/>
+          </a:ln>
         </p:spPr>
         <p:txBody>
           <a:bodyPr anchorCtr="0" anchor="t" bIns="45700" lIns="91425" spcFirstLastPara="1" rIns="91425" wrap="square" tIns="45700">
@@ -3048,12 +3260,16 @@
           <a:lstStyle/>
           <a:p>
             <a:pPr indent="0" lvl="0" marL="0" rtl="0" algn="l">
-              <a:spcBef>
-                <a:spcPts val="0"/>
-              </a:spcBef>
-              <a:spcAft>
-                <a:spcPts val="0"/>
-              </a:spcAft>
+              <a:lnSpc>
+                <a:spcPct val="100000"/>
+              </a:lnSpc>
+              <a:spcBef>
+                <a:spcPts val="0"/>
+              </a:spcBef>
+              <a:spcAft>
+                <a:spcPts val="0"/>
+              </a:spcAft>
+              <a:buSzPts val="1400"/>
               <a:buNone/>
             </a:pPr>
             <a:r>
@@ -3096,6 +3312,16 @@
               </a:path>
             </a:pathLst>
           </a:custGeom>
+          <a:noFill/>
+          <a:ln cap="flat" cmpd="sng" w="12700">
+            <a:solidFill>
+              <a:srgbClr val="000000"/>
+            </a:solidFill>
+            <a:prstDash val="solid"/>
+            <a:round/>
+            <a:headEnd len="sm" w="sm" type="none"/>
+            <a:tailEnd len="sm" w="sm" type="none"/>
+          </a:ln>
         </p:spPr>
       </p:sp>
     </p:spTree>
@@ -16519,19 +16745,7 @@
                 <a:cs typeface="Calibri"/>
                 <a:sym typeface="Calibri"/>
               </a:rPr>
-              <a:t>Caso de negocio </a:t>
-            </a:r>
-            <a:r>
-              <a:rPr lang="es-419" sz="2800">
-                <a:solidFill>
-                  <a:schemeClr val="dk1"/>
-                </a:solidFill>
-                <a:latin typeface="Calibri"/>
-                <a:ea typeface="Calibri"/>
-                <a:cs typeface="Calibri"/>
-                <a:sym typeface="Calibri"/>
-              </a:rPr>
-              <a:t>Hotelería Web Perriot</a:t>
+              <a:t>Caso de negocio Hotelería Web Perriot</a:t>
             </a:r>
             <a:endParaRPr b="0" i="0" sz="2800" u="none" cap="none" strike="noStrike">
               <a:solidFill>
@@ -16573,7 +16787,15 @@
               </a:rPr>
               <a:t>Arquitectura Diseño Solución</a:t>
             </a:r>
-            <a:endParaRPr/>
+            <a:endParaRPr b="0" i="0" sz="1400" u="none" cap="none" strike="noStrike">
+              <a:solidFill>
+                <a:srgbClr val="000000"/>
+              </a:solidFill>
+              <a:latin typeface="Arial"/>
+              <a:ea typeface="Arial"/>
+              <a:cs typeface="Arial"/>
+              <a:sym typeface="Arial"/>
+            </a:endParaRPr>
           </a:p>
           <a:p>
             <a:pPr indent="0" lvl="0" marL="0" marR="0" rtl="0" algn="ctr">
@@ -16720,21 +16942,9 @@
                 <a:cs typeface="Calibri"/>
                 <a:sym typeface="Calibri"/>
               </a:rPr>
-              <a:t>Integrantes	: </a:t>
+              <a:t>Integrantes	: Gabriel Avendaño</a:t>
             </a:r>
-            <a:r>
-              <a:rPr lang="es-419" sz="2800">
-                <a:solidFill>
-                  <a:schemeClr val="lt1"/>
-                </a:solidFill>
-                <a:latin typeface="Calibri"/>
-                <a:ea typeface="Calibri"/>
-                <a:cs typeface="Calibri"/>
-                <a:sym typeface="Calibri"/>
-              </a:rPr>
-              <a:t>Gabriel Avendaño</a:t>
-            </a:r>
-            <a:endParaRPr sz="2800">
+            <a:endParaRPr b="0" i="0" sz="2800" u="none" cap="none" strike="noStrike">
               <a:solidFill>
                 <a:schemeClr val="lt1"/>
               </a:solidFill>
@@ -16763,7 +16973,7 @@
               <a:buNone/>
             </a:pPr>
             <a:r>
-              <a:rPr lang="es-419" sz="2800">
+              <a:rPr b="0" i="0" lang="es-419" sz="2800" u="none" cap="none" strike="noStrike">
                 <a:solidFill>
                   <a:schemeClr val="lt1"/>
                 </a:solidFill>
@@ -16774,7 +16984,7 @@
               </a:rPr>
               <a:t>                         Ignacio Coloma</a:t>
             </a:r>
-            <a:endParaRPr sz="2800">
+            <a:endParaRPr b="0" i="0" sz="2800" u="none" cap="none" strike="noStrike">
               <a:solidFill>
                 <a:schemeClr val="lt1"/>
               </a:solidFill>
@@ -16823,19 +17033,7 @@
                 <a:cs typeface="Calibri"/>
                 <a:sym typeface="Calibri"/>
               </a:rPr>
-              <a:t>Docente	:Christian Laz</a:t>
-            </a:r>
-            <a:r>
-              <a:rPr lang="es-419" sz="2800">
-                <a:solidFill>
-                  <a:schemeClr val="lt1"/>
-                </a:solidFill>
-                <a:latin typeface="Calibri"/>
-                <a:ea typeface="Calibri"/>
-                <a:cs typeface="Calibri"/>
-                <a:sym typeface="Calibri"/>
-              </a:rPr>
-              <a:t>cano</a:t>
+              <a:t>Docente	:Christian Lazcano</a:t>
             </a:r>
             <a:endParaRPr b="0" i="0" sz="5400" u="none" cap="none" strike="noStrike">
               <a:solidFill>
@@ -16955,13 +17153,12 @@
           <p:cNvPicPr preferRelativeResize="0"/>
           <p:nvPr/>
         </p:nvPicPr>
-        <p:blipFill>
+        <p:blipFill rotWithShape="1">
           <a:blip r:embed="rId3">
             <a:alphaModFix/>
           </a:blip>
-          <a:stretch>
-            <a:fillRect/>
-          </a:stretch>
+          <a:srcRect b="0" l="0" r="0" t="0"/>
+          <a:stretch/>
         </p:blipFill>
         <p:spPr>
           <a:xfrm>
@@ -17008,13 +17205,12 @@
           <p:cNvPicPr preferRelativeResize="0"/>
           <p:nvPr/>
         </p:nvPicPr>
-        <p:blipFill>
+        <p:blipFill rotWithShape="1">
           <a:blip r:embed="rId3">
             <a:alphaModFix/>
           </a:blip>
-          <a:stretch>
-            <a:fillRect/>
-          </a:stretch>
+          <a:srcRect b="0" l="0" r="0" t="0"/>
+          <a:stretch/>
         </p:blipFill>
         <p:spPr>
           <a:xfrm>
@@ -17450,16 +17646,24 @@
           <a:chExt cx="0" cy="0"/>
         </a:xfrm>
       </p:grpSpPr>
-      <p:sp>
-        <p:nvSpPr>
+      <p:pic>
+        <p:nvPicPr>
           <p:cNvPr id="199" name="Google Shape;199;p36"/>
-          <p:cNvSpPr/>
+          <p:cNvPicPr preferRelativeResize="0"/>
           <p:nvPr/>
-        </p:nvSpPr>
+        </p:nvPicPr>
+        <p:blipFill>
+          <a:blip r:embed="rId3">
+            <a:alphaModFix/>
+          </a:blip>
+          <a:stretch>
+            <a:fillRect/>
+          </a:stretch>
+        </p:blipFill>
         <p:spPr>
           <a:xfrm>
             <a:off x="0" y="0"/>
-            <a:ext cx="12192000" cy="6858000"/>
+            <a:ext cx="12191999" cy="6858001"/>
           </a:xfrm>
           <a:prstGeom prst="rect">
             <a:avLst/>
@@ -17471,184 +17675,17 @@
             <a:noFill/>
           </a:ln>
         </p:spPr>
-        <p:txBody>
-          <a:bodyPr anchorCtr="0" anchor="ctr" bIns="45700" lIns="91425" spcFirstLastPara="1" rIns="91425" wrap="square" tIns="45700">
-            <a:noAutofit/>
-          </a:bodyPr>
-          <a:lstStyle/>
-          <a:p>
-            <a:pPr indent="0" lvl="0" marL="0" marR="0" rtl="0" algn="ctr">
-              <a:lnSpc>
-                <a:spcPct val="100000"/>
-              </a:lnSpc>
-              <a:spcBef>
-                <a:spcPts val="0"/>
-              </a:spcBef>
-              <a:spcAft>
-                <a:spcPts val="0"/>
-              </a:spcAft>
-              <a:buNone/>
-            </a:pPr>
-            <a:r>
-              <a:t/>
-            </a:r>
-            <a:endParaRPr b="0" i="0" sz="1400" u="none" cap="none" strike="noStrike">
-              <a:solidFill>
-                <a:schemeClr val="lt1"/>
-              </a:solidFill>
-              <a:latin typeface="Arial"/>
-              <a:ea typeface="Arial"/>
-              <a:cs typeface="Arial"/>
-              <a:sym typeface="Arial"/>
-            </a:endParaRPr>
-          </a:p>
-        </p:txBody>
-      </p:sp>
-      <p:pic>
-        <p:nvPicPr>
-          <p:cNvPr descr="Arquitectura de microservicios: qué es, ventajas y desventajas" id="200" name="Google Shape;200;p36"/>
-          <p:cNvPicPr preferRelativeResize="0"/>
-          <p:nvPr/>
-        </p:nvPicPr>
-        <p:blipFill rotWithShape="1">
-          <a:blip r:embed="rId3">
-            <a:alphaModFix/>
-          </a:blip>
-          <a:srcRect b="0" l="38793" r="21764" t="0"/>
-          <a:stretch/>
-        </p:blipFill>
-        <p:spPr>
-          <a:xfrm>
-            <a:off x="20" y="10"/>
-            <a:ext cx="5409897" cy="6857990"/>
-          </a:xfrm>
-          <a:prstGeom prst="rect">
-            <a:avLst/>
-          </a:prstGeom>
-          <a:noFill/>
-          <a:ln>
-            <a:noFill/>
-          </a:ln>
-        </p:spPr>
       </p:pic>
       <p:sp>
         <p:nvSpPr>
-          <p:cNvPr id="201" name="Google Shape;201;p36"/>
-          <p:cNvSpPr/>
-          <p:nvPr/>
-        </p:nvSpPr>
-        <p:spPr>
-          <a:xfrm>
-            <a:off x="5410200" y="1"/>
-            <a:ext cx="6781801" cy="6857999"/>
-          </a:xfrm>
-          <a:prstGeom prst="rect">
-            <a:avLst/>
-          </a:prstGeom>
-          <a:solidFill>
-            <a:srgbClr val="FEE8CF"/>
-          </a:solidFill>
-          <a:ln>
-            <a:noFill/>
-          </a:ln>
-        </p:spPr>
-        <p:txBody>
-          <a:bodyPr anchorCtr="0" anchor="ctr" bIns="45700" lIns="91425" spcFirstLastPara="1" rIns="91425" wrap="square" tIns="45700">
-            <a:noAutofit/>
-          </a:bodyPr>
-          <a:lstStyle/>
-          <a:p>
-            <a:pPr indent="0" lvl="0" marL="0" marR="0" rtl="0" algn="ctr">
-              <a:lnSpc>
-                <a:spcPct val="100000"/>
-              </a:lnSpc>
-              <a:spcBef>
-                <a:spcPts val="0"/>
-              </a:spcBef>
-              <a:spcAft>
-                <a:spcPts val="0"/>
-              </a:spcAft>
-              <a:buNone/>
-            </a:pPr>
-            <a:r>
-              <a:t/>
-            </a:r>
-            <a:endParaRPr b="0" i="0" sz="1400" u="none" cap="none" strike="noStrike">
-              <a:solidFill>
-                <a:schemeClr val="lt1"/>
-              </a:solidFill>
-              <a:latin typeface="Arial"/>
-              <a:ea typeface="Arial"/>
-              <a:cs typeface="Arial"/>
-              <a:sym typeface="Arial"/>
-            </a:endParaRPr>
-          </a:p>
-        </p:txBody>
-      </p:sp>
-      <p:sp>
-        <p:nvSpPr>
-          <p:cNvPr id="202" name="Google Shape;202;p36"/>
-          <p:cNvSpPr/>
-          <p:nvPr/>
-        </p:nvSpPr>
-        <p:spPr>
-          <a:xfrm>
-            <a:off x="6096565" y="685800"/>
-            <a:ext cx="5409636" cy="5486400"/>
-          </a:xfrm>
-          <a:prstGeom prst="rect">
-            <a:avLst/>
-          </a:prstGeom>
-          <a:solidFill>
-            <a:schemeClr val="lt1"/>
-          </a:solidFill>
-          <a:ln>
-            <a:noFill/>
-          </a:ln>
-        </p:spPr>
-        <p:txBody>
-          <a:bodyPr anchorCtr="0" anchor="ctr" bIns="45700" lIns="91425" spcFirstLastPara="1" rIns="91425" wrap="square" tIns="45700">
-            <a:noAutofit/>
-          </a:bodyPr>
-          <a:lstStyle/>
-          <a:p>
-            <a:pPr indent="0" lvl="0" marL="0" marR="0" rtl="0" algn="ctr">
-              <a:lnSpc>
-                <a:spcPct val="100000"/>
-              </a:lnSpc>
-              <a:spcBef>
-                <a:spcPts val="0"/>
-              </a:spcBef>
-              <a:spcAft>
-                <a:spcPts val="0"/>
-              </a:spcAft>
-              <a:buNone/>
-            </a:pPr>
-            <a:r>
-              <a:t/>
-            </a:r>
-            <a:endParaRPr b="0" i="0" sz="1400" u="none" cap="none" strike="noStrike">
-              <a:solidFill>
-                <a:schemeClr val="lt1"/>
-              </a:solidFill>
-              <a:latin typeface="Arial"/>
-              <a:ea typeface="Arial"/>
-              <a:cs typeface="Arial"/>
-              <a:sym typeface="Arial"/>
-            </a:endParaRPr>
-          </a:p>
-        </p:txBody>
-      </p:sp>
-      <p:sp>
-        <p:nvSpPr>
-          <p:cNvPr id="203" name="Google Shape;203;p36"/>
+          <p:cNvPr id="200" name="Google Shape;200;p36"/>
           <p:cNvSpPr txBox="1"/>
           <p:nvPr/>
         </p:nvSpPr>
         <p:spPr>
           <a:xfrm>
-            <a:off x="6416336" y="685799"/>
-            <a:ext cx="4403781" cy="907199"/>
+            <a:off x="5180725" y="-47350"/>
+            <a:ext cx="2035800" cy="459900"/>
           </a:xfrm>
           <a:prstGeom prst="rect">
             <a:avLst/>
@@ -17660,7 +17697,7 @@
         </p:spPr>
         <p:txBody>
           <a:bodyPr anchorCtr="0" anchor="b" bIns="45700" lIns="91425" spcFirstLastPara="1" rIns="91425" wrap="square" tIns="45700">
-            <a:normAutofit fontScale="92500"/>
+            <a:normAutofit/>
           </a:bodyPr>
           <a:lstStyle/>
           <a:p>
@@ -17674,6 +17711,11 @@
               <a:spcAft>
                 <a:spcPts val="0"/>
               </a:spcAft>
+              <a:buClr>
+                <a:srgbClr val="000000"/>
+              </a:buClr>
+              <a:buSzPts val="2500"/>
+              <a:buFont typeface="Arial"/>
               <a:buNone/>
             </a:pPr>
             <a:r>
@@ -17686,36 +17728,17 @@
                 <a:cs typeface="Arial"/>
                 <a:sym typeface="Arial"/>
               </a:rPr>
-              <a:t>Roadmap - Trello</a:t>
+              <a:t>Roadmap </a:t>
             </a:r>
-            <a:endParaRPr/>
-          </a:p>
-          <a:p>
-            <a:pPr indent="0" lvl="0" marL="0" marR="0" rtl="0" algn="ctr">
-              <a:lnSpc>
-                <a:spcPct val="90000"/>
-              </a:lnSpc>
-              <a:spcBef>
-                <a:spcPts val="600"/>
-              </a:spcBef>
-              <a:spcAft>
-                <a:spcPts val="600"/>
-              </a:spcAft>
-              <a:buNone/>
-            </a:pPr>
-            <a:r>
-              <a:rPr b="0" i="0" lang="es-419" sz="2500" u="none" cap="none" strike="noStrike">
-                <a:solidFill>
-                  <a:srgbClr val="595959"/>
-                </a:solidFill>
-                <a:latin typeface="Arial"/>
-                <a:ea typeface="Arial"/>
-                <a:cs typeface="Arial"/>
-                <a:sym typeface="Arial"/>
-              </a:rPr>
-              <a:t>Principales entregables FASE 2</a:t>
-            </a:r>
-            <a:endParaRPr/>
+            <a:endParaRPr b="0" i="0" sz="1400" u="none" cap="none" strike="noStrike">
+              <a:solidFill>
+                <a:srgbClr val="000000"/>
+              </a:solidFill>
+              <a:latin typeface="Arial"/>
+              <a:ea typeface="Arial"/>
+              <a:cs typeface="Arial"/>
+              <a:sym typeface="Arial"/>
+            </a:endParaRPr>
           </a:p>
         </p:txBody>
       </p:sp>
@@ -17730,9 +17753,16 @@
 <file path=ppt/slides/slide15.xml><?xml version="1.0" encoding="utf-8"?>
 <p:sld xmlns:a="http://schemas.openxmlformats.org/drawingml/2006/main" xmlns:r="http://schemas.openxmlformats.org/officeDocument/2006/relationships" xmlns:mc="http://schemas.openxmlformats.org/markup-compatibility/2006" xmlns:mv="urn:schemas-microsoft-com:mac:vml" xmlns:p="http://schemas.openxmlformats.org/presentationml/2006/main" xmlns:c="http://schemas.openxmlformats.org/drawingml/2006/chart" xmlns:dgm="http://schemas.openxmlformats.org/drawingml/2006/diagram" xmlns:o="urn:schemas-microsoft-com:office:office" xmlns:v="urn:schemas-microsoft-com:vml" xmlns:pvml="urn:schemas-microsoft-com:office:powerpoint" xmlns:com="http://schemas.openxmlformats.org/drawingml/2006/compatibility" xmlns:p14="http://schemas.microsoft.com/office/powerpoint/2010/main" xmlns:p15="http://schemas.microsoft.com/office/powerpoint/2012/main" xmlns:ahyp="http://schemas.microsoft.com/office/drawing/2018/hyperlinkcolor">
   <p:cSld>
+    <p:bg>
+      <p:bgPr>
+        <a:solidFill>
+          <a:schemeClr val="lt1"/>
+        </a:solidFill>
+      </p:bgPr>
+    </p:bg>
     <p:spTree>
       <p:nvGrpSpPr>
-        <p:cNvPr id="207" name="Shape 207"/>
+        <p:cNvPr id="204" name="Shape 204"/>
         <p:cNvGrpSpPr/>
         <p:nvPr/>
       </p:nvGrpSpPr>
@@ -17746,7 +17776,157 @@
       </p:grpSpPr>
       <p:sp>
         <p:nvSpPr>
-          <p:cNvPr id="208" name="Google Shape;208;p34"/>
+          <p:cNvPr id="205" name="Google Shape;205;g31083fedd1d_0_0"/>
+          <p:cNvSpPr txBox="1"/>
+          <p:nvPr/>
+        </p:nvSpPr>
+        <p:spPr>
+          <a:xfrm>
+            <a:off x="4883100" y="33800"/>
+            <a:ext cx="1440600" cy="507300"/>
+          </a:xfrm>
+          <a:prstGeom prst="rect">
+            <a:avLst/>
+          </a:prstGeom>
+          <a:noFill/>
+          <a:ln>
+            <a:noFill/>
+          </a:ln>
+        </p:spPr>
+        <p:txBody>
+          <a:bodyPr anchorCtr="0" anchor="b" bIns="45700" lIns="91425" spcFirstLastPara="1" rIns="91425" wrap="square" tIns="45700">
+            <a:normAutofit fontScale="40000" lnSpcReduction="20000"/>
+          </a:bodyPr>
+          <a:lstStyle/>
+          <a:p>
+            <a:pPr indent="0" lvl="0" marL="0" marR="0" rtl="0" algn="ctr">
+              <a:lnSpc>
+                <a:spcPct val="90000"/>
+              </a:lnSpc>
+              <a:spcBef>
+                <a:spcPts val="0"/>
+              </a:spcBef>
+              <a:spcAft>
+                <a:spcPts val="0"/>
+              </a:spcAft>
+              <a:buClr>
+                <a:srgbClr val="000000"/>
+              </a:buClr>
+              <a:buSzPct val="40676"/>
+              <a:buFont typeface="Arial"/>
+              <a:buNone/>
+            </a:pPr>
+            <a:r>
+              <a:rPr b="0" i="0" lang="es-419" sz="6146" u="none" cap="none" strike="noStrike">
+                <a:solidFill>
+                  <a:srgbClr val="595959"/>
+                </a:solidFill>
+                <a:latin typeface="Arial"/>
+                <a:ea typeface="Arial"/>
+                <a:cs typeface="Arial"/>
+                <a:sym typeface="Arial"/>
+              </a:rPr>
+              <a:t>Trello</a:t>
+            </a:r>
+            <a:endParaRPr b="0" i="0" sz="5046" u="none" cap="none" strike="noStrike">
+              <a:solidFill>
+                <a:srgbClr val="000000"/>
+              </a:solidFill>
+              <a:latin typeface="Arial"/>
+              <a:ea typeface="Arial"/>
+              <a:cs typeface="Arial"/>
+              <a:sym typeface="Arial"/>
+            </a:endParaRPr>
+          </a:p>
+          <a:p>
+            <a:pPr indent="0" lvl="0" marL="0" marR="0" rtl="0" algn="ctr">
+              <a:lnSpc>
+                <a:spcPct val="90000"/>
+              </a:lnSpc>
+              <a:spcBef>
+                <a:spcPts val="600"/>
+              </a:spcBef>
+              <a:spcAft>
+                <a:spcPts val="600"/>
+              </a:spcAft>
+              <a:buClr>
+                <a:srgbClr val="000000"/>
+              </a:buClr>
+              <a:buSzPct val="178571"/>
+              <a:buFont typeface="Arial"/>
+              <a:buNone/>
+            </a:pPr>
+            <a:r>
+              <a:t/>
+            </a:r>
+            <a:endParaRPr b="0" i="0" sz="1400" u="none" cap="none" strike="noStrike">
+              <a:solidFill>
+                <a:srgbClr val="000000"/>
+              </a:solidFill>
+              <a:latin typeface="Arial"/>
+              <a:ea typeface="Arial"/>
+              <a:cs typeface="Arial"/>
+              <a:sym typeface="Arial"/>
+            </a:endParaRPr>
+          </a:p>
+        </p:txBody>
+      </p:sp>
+      <p:pic>
+        <p:nvPicPr>
+          <p:cNvPr id="206" name="Google Shape;206;g31083fedd1d_0_0"/>
+          <p:cNvPicPr preferRelativeResize="0"/>
+          <p:nvPr/>
+        </p:nvPicPr>
+        <p:blipFill>
+          <a:blip r:embed="rId3">
+            <a:alphaModFix/>
+          </a:blip>
+          <a:stretch>
+            <a:fillRect/>
+          </a:stretch>
+        </p:blipFill>
+        <p:spPr>
+          <a:xfrm>
+            <a:off x="0" y="507300"/>
+            <a:ext cx="12192001" cy="6320051"/>
+          </a:xfrm>
+          <a:prstGeom prst="rect">
+            <a:avLst/>
+          </a:prstGeom>
+          <a:noFill/>
+          <a:ln>
+            <a:noFill/>
+          </a:ln>
+        </p:spPr>
+      </p:pic>
+    </p:spTree>
+  </p:cSld>
+  <p:clrMapOvr>
+    <a:masterClrMapping/>
+  </p:clrMapOvr>
+</p:sld>
+</file>
+
+<file path=ppt/slides/slide16.xml><?xml version="1.0" encoding="utf-8"?>
+<p:sld xmlns:a="http://schemas.openxmlformats.org/drawingml/2006/main" xmlns:r="http://schemas.openxmlformats.org/officeDocument/2006/relationships" xmlns:mc="http://schemas.openxmlformats.org/markup-compatibility/2006" xmlns:mv="urn:schemas-microsoft-com:mac:vml" xmlns:p="http://schemas.openxmlformats.org/presentationml/2006/main" xmlns:c="http://schemas.openxmlformats.org/drawingml/2006/chart" xmlns:dgm="http://schemas.openxmlformats.org/drawingml/2006/diagram" xmlns:o="urn:schemas-microsoft-com:office:office" xmlns:v="urn:schemas-microsoft-com:vml" xmlns:pvml="urn:schemas-microsoft-com:office:powerpoint" xmlns:com="http://schemas.openxmlformats.org/drawingml/2006/compatibility" xmlns:p14="http://schemas.microsoft.com/office/powerpoint/2010/main" xmlns:p15="http://schemas.microsoft.com/office/powerpoint/2012/main" xmlns:ahyp="http://schemas.microsoft.com/office/drawing/2018/hyperlinkcolor">
+  <p:cSld>
+    <p:spTree>
+      <p:nvGrpSpPr>
+        <p:cNvPr id="210" name="Shape 210"/>
+        <p:cNvGrpSpPr/>
+        <p:nvPr/>
+      </p:nvGrpSpPr>
+      <p:grpSpPr>
+        <a:xfrm>
+          <a:off x="0" y="0"/>
+          <a:ext cx="0" cy="0"/>
+          <a:chOff x="0" y="0"/>
+          <a:chExt cx="0" cy="0"/>
+        </a:xfrm>
+      </p:grpSpPr>
+      <p:sp>
+        <p:nvSpPr>
+          <p:cNvPr id="211" name="Google Shape;211;p34"/>
           <p:cNvSpPr txBox="1"/>
           <p:nvPr>
             <p:ph type="title"/>
@@ -17810,7 +17990,7 @@
       </p:sp>
       <p:pic>
         <p:nvPicPr>
-          <p:cNvPr descr="Dentistas 3.0: Diagnóstico por imagen - IMED Dental" id="209" name="Google Shape;209;p34"/>
+          <p:cNvPr descr="Dentistas 3.0: Diagnóstico por imagen - IMED Dental" id="212" name="Google Shape;212;p34"/>
           <p:cNvPicPr preferRelativeResize="0"/>
           <p:nvPr/>
         </p:nvPicPr>
@@ -17929,6 +18109,11 @@
               <a:spcAft>
                 <a:spcPts val="0"/>
               </a:spcAft>
+              <a:buClr>
+                <a:srgbClr val="000000"/>
+              </a:buClr>
+              <a:buSzPts val="1400"/>
+              <a:buFont typeface="Arial"/>
               <a:buNone/>
             </a:pPr>
             <a:r>
@@ -17956,7 +18141,7 @@
           <a:blip r:embed="rId3">
             <a:alphaModFix/>
           </a:blip>
-          <a:srcRect b="0" l="23265" r="6235" t="0"/>
+          <a:srcRect b="0" l="23265" r="6234" t="0"/>
           <a:stretch/>
         </p:blipFill>
         <p:spPr>
@@ -17996,12 +18181,12 @@
               </a:gs>
               <a:gs pos="19000">
                 <a:srgbClr val="FFFFFF">
-                  <a:alpha val="37647"/>
+                  <a:alpha val="37254"/>
                 </a:srgbClr>
               </a:gs>
               <a:gs pos="35000">
                 <a:srgbClr val="FFFFFF">
-                  <a:alpha val="76862"/>
+                  <a:alpha val="76470"/>
                 </a:srgbClr>
               </a:gs>
               <a:gs pos="48000">
@@ -18033,6 +18218,11 @@
               <a:spcAft>
                 <a:spcPts val="0"/>
               </a:spcAft>
+              <a:buClr>
+                <a:srgbClr val="000000"/>
+              </a:buClr>
+              <a:buSzPts val="1400"/>
+              <a:buFont typeface="Arial"/>
               <a:buNone/>
             </a:pPr>
             <a:r>
@@ -18085,6 +18275,11 @@
               <a:spcAft>
                 <a:spcPts val="600"/>
               </a:spcAft>
+              <a:buClr>
+                <a:srgbClr val="000000"/>
+              </a:buClr>
+              <a:buSzPts val="4000"/>
+              <a:buFont typeface="Arial"/>
               <a:buNone/>
             </a:pPr>
             <a:r>
@@ -18099,7 +18294,15 @@
               </a:rPr>
               <a:t>Alcances de la propuesta</a:t>
             </a:r>
-            <a:endParaRPr/>
+            <a:endParaRPr b="0" i="0" sz="1400" u="none" cap="none" strike="noStrike">
+              <a:solidFill>
+                <a:srgbClr val="000000"/>
+              </a:solidFill>
+              <a:latin typeface="Arial"/>
+              <a:ea typeface="Arial"/>
+              <a:cs typeface="Arial"/>
+              <a:sym typeface="Arial"/>
+            </a:endParaRPr>
           </a:p>
         </p:txBody>
       </p:sp>
@@ -18138,6 +18341,11 @@
               <a:spcAft>
                 <a:spcPts val="0"/>
               </a:spcAft>
+              <a:buClr>
+                <a:srgbClr val="000000"/>
+              </a:buClr>
+              <a:buSzPts val="1600"/>
+              <a:buFont typeface="Arial"/>
               <a:buNone/>
             </a:pPr>
             <a:r>
@@ -18163,7 +18371,7 @@
             </a:endParaRPr>
           </a:p>
           <a:p>
-            <a:pPr indent="0" lvl="0" marL="0" marR="0" rtl="0" algn="r">
+            <a:pPr indent="-101600" lvl="0" marL="0" marR="0" rtl="0" algn="r">
               <a:lnSpc>
                 <a:spcPct val="150000"/>
               </a:lnSpc>
@@ -18192,10 +18400,18 @@
               </a:rPr>
               <a:t>Las características generales del diseño</a:t>
             </a:r>
-            <a:endParaRPr/>
+            <a:endParaRPr b="0" i="0" sz="1400" u="none" cap="none" strike="noStrike">
+              <a:solidFill>
+                <a:srgbClr val="000000"/>
+              </a:solidFill>
+              <a:latin typeface="Arial"/>
+              <a:ea typeface="Arial"/>
+              <a:cs typeface="Arial"/>
+              <a:sym typeface="Arial"/>
+            </a:endParaRPr>
           </a:p>
           <a:p>
-            <a:pPr indent="0" lvl="0" marL="0" marR="0" rtl="0" algn="r">
+            <a:pPr indent="-101600" lvl="0" marL="0" marR="0" rtl="0" algn="r">
               <a:lnSpc>
                 <a:spcPct val="150000"/>
               </a:lnSpc>
@@ -18224,10 +18440,18 @@
               </a:rPr>
               <a:t>Los requisitos atendidos por el diseño</a:t>
             </a:r>
-            <a:endParaRPr/>
+            <a:endParaRPr b="0" i="0" sz="1400" u="none" cap="none" strike="noStrike">
+              <a:solidFill>
+                <a:srgbClr val="000000"/>
+              </a:solidFill>
+              <a:latin typeface="Arial"/>
+              <a:ea typeface="Arial"/>
+              <a:cs typeface="Arial"/>
+              <a:sym typeface="Arial"/>
+            </a:endParaRPr>
           </a:p>
           <a:p>
-            <a:pPr indent="0" lvl="0" marL="0" marR="0" rtl="0" algn="r">
+            <a:pPr indent="-101600" lvl="0" marL="0" marR="0" rtl="0" algn="r">
               <a:lnSpc>
                 <a:spcPct val="150000"/>
               </a:lnSpc>
@@ -18256,7 +18480,15 @@
               </a:rPr>
               <a:t>Los modelos y vistas que lo detalla</a:t>
             </a:r>
-            <a:endParaRPr/>
+            <a:endParaRPr b="0" i="0" sz="1400" u="none" cap="none" strike="noStrike">
+              <a:solidFill>
+                <a:srgbClr val="000000"/>
+              </a:solidFill>
+              <a:latin typeface="Arial"/>
+              <a:ea typeface="Arial"/>
+              <a:cs typeface="Arial"/>
+              <a:sym typeface="Arial"/>
+            </a:endParaRPr>
           </a:p>
         </p:txBody>
       </p:sp>
@@ -18276,7 +18508,7 @@
           </a:prstGeom>
           <a:solidFill>
             <a:srgbClr val="595959">
-              <a:alpha val="69803"/>
+              <a:alpha val="69411"/>
             </a:srgbClr>
           </a:solidFill>
           <a:ln cap="flat" cmpd="sng" w="9525">
@@ -18305,6 +18537,11 @@
               <a:spcAft>
                 <a:spcPts val="0"/>
               </a:spcAft>
+              <a:buClr>
+                <a:srgbClr val="000000"/>
+              </a:buClr>
+              <a:buSzPts val="1400"/>
+              <a:buFont typeface="Arial"/>
               <a:buNone/>
             </a:pPr>
             <a:r>
@@ -18319,7 +18556,15 @@
               </a:rPr>
               <a:t>Referencias y estándares aplicables a este documento: </a:t>
             </a:r>
-            <a:endParaRPr/>
+            <a:endParaRPr b="0" i="0" sz="1400" u="none" cap="none" strike="noStrike">
+              <a:solidFill>
+                <a:srgbClr val="000000"/>
+              </a:solidFill>
+              <a:latin typeface="Arial"/>
+              <a:ea typeface="Arial"/>
+              <a:cs typeface="Arial"/>
+              <a:sym typeface="Arial"/>
+            </a:endParaRPr>
           </a:p>
           <a:p>
             <a:pPr indent="-285750" lvl="0" marL="285750" marR="0" rtl="0" algn="l">
@@ -18391,7 +18636,15 @@
               </a:rPr>
               <a:t>ISO/IEC 25010</a:t>
             </a:r>
-            <a:endParaRPr/>
+            <a:endParaRPr b="0" i="0" sz="1400" u="none" cap="none" strike="noStrike">
+              <a:solidFill>
+                <a:srgbClr val="000000"/>
+              </a:solidFill>
+              <a:latin typeface="Arial"/>
+              <a:ea typeface="Arial"/>
+              <a:cs typeface="Arial"/>
+              <a:sym typeface="Arial"/>
+            </a:endParaRPr>
           </a:p>
           <a:p>
             <a:pPr indent="-285750" lvl="0" marL="285750" marR="0" rtl="0" algn="l">
@@ -18444,6 +18697,11 @@
               <a:spcAft>
                 <a:spcPts val="0"/>
               </a:spcAft>
+              <a:buClr>
+                <a:srgbClr val="000000"/>
+              </a:buClr>
+              <a:buSzPts val="1400"/>
+              <a:buFont typeface="Arial"/>
               <a:buNone/>
             </a:pPr>
             <a:r>
@@ -18479,6 +18737,11 @@
               <a:spcAft>
                 <a:spcPts val="0"/>
               </a:spcAft>
+              <a:buClr>
+                <a:srgbClr val="000000"/>
+              </a:buClr>
+              <a:buSzPts val="1400"/>
+              <a:buFont typeface="Arial"/>
               <a:buNone/>
             </a:pPr>
             <a:r>
@@ -18514,6 +18777,11 @@
               <a:spcAft>
                 <a:spcPts val="0"/>
               </a:spcAft>
+              <a:buClr>
+                <a:srgbClr val="000000"/>
+              </a:buClr>
+              <a:buSzPts val="1400"/>
+              <a:buFont typeface="Arial"/>
               <a:buNone/>
             </a:pPr>
             <a:r>
@@ -18609,6 +18877,11 @@
               <a:spcAft>
                 <a:spcPts val="0"/>
               </a:spcAft>
+              <a:buClr>
+                <a:srgbClr val="000000"/>
+              </a:buClr>
+              <a:buSzPts val="1400"/>
+              <a:buFont typeface="Arial"/>
               <a:buNone/>
             </a:pPr>
             <a:r>
@@ -18690,6 +18963,11 @@
               <a:spcAft>
                 <a:spcPts val="0"/>
               </a:spcAft>
+              <a:buClr>
+                <a:srgbClr val="000000"/>
+              </a:buClr>
+              <a:buSzPts val="1400"/>
+              <a:buFont typeface="Arial"/>
               <a:buNone/>
             </a:pPr>
             <a:r>
@@ -18744,6 +19022,11 @@
               <a:spcAft>
                 <a:spcPts val="0"/>
               </a:spcAft>
+              <a:buClr>
+                <a:srgbClr val="000000"/>
+              </a:buClr>
+              <a:buSzPts val="1400"/>
+              <a:buFont typeface="Arial"/>
               <a:buNone/>
             </a:pPr>
             <a:r>
@@ -18796,6 +19079,11 @@
               <a:spcAft>
                 <a:spcPts val="600"/>
               </a:spcAft>
+              <a:buClr>
+                <a:srgbClr val="000000"/>
+              </a:buClr>
+              <a:buSzPts val="2500"/>
+              <a:buFont typeface="Arial"/>
               <a:buNone/>
             </a:pPr>
             <a:r>
@@ -18810,7 +19098,15 @@
               </a:rPr>
               <a:t>Descripción caso de negocio</a:t>
             </a:r>
-            <a:endParaRPr/>
+            <a:endParaRPr b="0" i="0" sz="1400" u="none" cap="none" strike="noStrike">
+              <a:solidFill>
+                <a:srgbClr val="000000"/>
+              </a:solidFill>
+              <a:latin typeface="Arial"/>
+              <a:ea typeface="Arial"/>
+              <a:cs typeface="Arial"/>
+              <a:sym typeface="Arial"/>
+            </a:endParaRPr>
           </a:p>
         </p:txBody>
       </p:sp>
@@ -18839,7 +19135,7 @@
           </a:bodyPr>
           <a:lstStyle/>
           <a:p>
-            <a:pPr indent="0" lvl="0" marL="0" marR="0" rtl="0" algn="l">
+            <a:pPr indent="-127000" lvl="0" marL="0" marR="0" rtl="0" algn="l">
               <a:lnSpc>
                 <a:spcPct val="90000"/>
               </a:lnSpc>
@@ -18868,7 +19164,15 @@
               </a:rPr>
               <a:t>Problema o Necesidad a cubrir</a:t>
             </a:r>
-            <a:endParaRPr/>
+            <a:endParaRPr b="0" i="0" sz="1400" u="none" cap="none" strike="noStrike">
+              <a:solidFill>
+                <a:srgbClr val="000000"/>
+              </a:solidFill>
+              <a:latin typeface="Arial"/>
+              <a:ea typeface="Arial"/>
+              <a:cs typeface="Arial"/>
+              <a:sym typeface="Arial"/>
+            </a:endParaRPr>
           </a:p>
           <a:p>
             <a:pPr indent="127000" lvl="0" marL="0" marR="0" rtl="0" algn="l">
@@ -18916,20 +19220,33 @@
                 <a:srgbClr val="595959"/>
               </a:buClr>
               <a:buSzPts val="2000"/>
+              <a:buFont typeface="Arial"/>
               <a:buChar char="•"/>
             </a:pPr>
             <a:r>
-              <a:rPr lang="es-419" sz="2000">
+              <a:rPr b="0" i="0" lang="es-419" sz="2000" u="none" cap="none" strike="noStrike">
                 <a:solidFill>
                   <a:srgbClr val="595959"/>
                 </a:solidFill>
+                <a:latin typeface="Arial"/>
+                <a:ea typeface="Arial"/>
+                <a:cs typeface="Arial"/>
+                <a:sym typeface="Arial"/>
               </a:rPr>
               <a:t>Problemas para administrar     las reservas de su hotel canino.</a:t>
             </a:r>
-            <a:endParaRPr/>
+            <a:endParaRPr b="0" i="0" sz="1400" u="none" cap="none" strike="noStrike">
+              <a:solidFill>
+                <a:srgbClr val="000000"/>
+              </a:solidFill>
+              <a:latin typeface="Arial"/>
+              <a:ea typeface="Arial"/>
+              <a:cs typeface="Arial"/>
+              <a:sym typeface="Arial"/>
+            </a:endParaRPr>
           </a:p>
           <a:p>
-            <a:pPr indent="0" lvl="0" marL="0" marR="0" rtl="0" algn="l">
+            <a:pPr indent="-127000" lvl="0" marL="0" marR="0" rtl="0" algn="l">
               <a:lnSpc>
                 <a:spcPct val="90000"/>
               </a:lnSpc>
@@ -18958,10 +19275,18 @@
               </a:rPr>
               <a:t>Xxxxxxxxxxxxxxxx</a:t>
             </a:r>
-            <a:endParaRPr/>
+            <a:endParaRPr b="0" i="0" sz="1400" u="none" cap="none" strike="noStrike">
+              <a:solidFill>
+                <a:srgbClr val="000000"/>
+              </a:solidFill>
+              <a:latin typeface="Arial"/>
+              <a:ea typeface="Arial"/>
+              <a:cs typeface="Arial"/>
+              <a:sym typeface="Arial"/>
+            </a:endParaRPr>
           </a:p>
           <a:p>
-            <a:pPr indent="0" lvl="0" marL="0" marR="0" rtl="0" algn="l">
+            <a:pPr indent="-127000" lvl="0" marL="0" marR="0" rtl="0" algn="l">
               <a:lnSpc>
                 <a:spcPct val="90000"/>
               </a:lnSpc>
@@ -18990,7 +19315,15 @@
               </a:rPr>
               <a:t>xxxxxxxxxxxxxxxxx</a:t>
             </a:r>
-            <a:endParaRPr/>
+            <a:endParaRPr b="0" i="0" sz="1400" u="none" cap="none" strike="noStrike">
+              <a:solidFill>
+                <a:srgbClr val="000000"/>
+              </a:solidFill>
+              <a:latin typeface="Arial"/>
+              <a:ea typeface="Arial"/>
+              <a:cs typeface="Arial"/>
+              <a:sym typeface="Arial"/>
+            </a:endParaRPr>
           </a:p>
         </p:txBody>
       </p:sp>
@@ -19063,6 +19396,11 @@
               <a:spcAft>
                 <a:spcPts val="0"/>
               </a:spcAft>
+              <a:buClr>
+                <a:srgbClr val="000000"/>
+              </a:buClr>
+              <a:buSzPts val="1400"/>
+              <a:buFont typeface="Arial"/>
               <a:buNone/>
             </a:pPr>
             <a:r>
@@ -19144,6 +19482,11 @@
               <a:spcAft>
                 <a:spcPts val="0"/>
               </a:spcAft>
+              <a:buClr>
+                <a:srgbClr val="000000"/>
+              </a:buClr>
+              <a:buSzPts val="1400"/>
+              <a:buFont typeface="Arial"/>
               <a:buNone/>
             </a:pPr>
             <a:r>
@@ -19198,6 +19541,11 @@
               <a:spcAft>
                 <a:spcPts val="0"/>
               </a:spcAft>
+              <a:buClr>
+                <a:srgbClr val="000000"/>
+              </a:buClr>
+              <a:buSzPts val="1400"/>
+              <a:buFont typeface="Arial"/>
               <a:buNone/>
             </a:pPr>
             <a:r>
@@ -19250,6 +19598,11 @@
               <a:spcAft>
                 <a:spcPts val="600"/>
               </a:spcAft>
+              <a:buClr>
+                <a:srgbClr val="000000"/>
+              </a:buClr>
+              <a:buSzPts val="2500"/>
+              <a:buFont typeface="Arial"/>
               <a:buNone/>
             </a:pPr>
             <a:r>
@@ -19264,7 +19617,15 @@
               </a:rPr>
               <a:t>Descripción caso de negocio</a:t>
             </a:r>
-            <a:endParaRPr/>
+            <a:endParaRPr b="0" i="0" sz="1400" u="none" cap="none" strike="noStrike">
+              <a:solidFill>
+                <a:srgbClr val="000000"/>
+              </a:solidFill>
+              <a:latin typeface="Arial"/>
+              <a:ea typeface="Arial"/>
+              <a:cs typeface="Arial"/>
+              <a:sym typeface="Arial"/>
+            </a:endParaRPr>
           </a:p>
         </p:txBody>
       </p:sp>
@@ -19303,6 +19664,11 @@
               <a:spcAft>
                 <a:spcPts val="0"/>
               </a:spcAft>
+              <a:buClr>
+                <a:srgbClr val="000000"/>
+              </a:buClr>
+              <a:buSzPct val="100000"/>
+              <a:buFont typeface="Arial"/>
               <a:buNone/>
             </a:pPr>
             <a:r>
@@ -19329,7 +19695,7 @@
               </a:rPr>
             </a:br>
             <a:r>
-              <a:rPr lang="es-419" sz="2200">
+              <a:rPr b="0" i="0" lang="es-419" sz="2200" u="none" cap="none" strike="noStrike">
                 <a:solidFill>
                   <a:srgbClr val="3F3F3F"/>
                 </a:solidFill>
@@ -19395,10 +19761,15 @@
               <a:spcAft>
                 <a:spcPts val="0"/>
               </a:spcAft>
+              <a:buClr>
+                <a:srgbClr val="000000"/>
+              </a:buClr>
+              <a:buSzPct val="100000"/>
+              <a:buFont typeface="Arial"/>
               <a:buNone/>
             </a:pPr>
             <a:r>
-              <a:rPr lang="es-419" sz="2200">
+              <a:rPr b="0" i="0" lang="es-419" sz="2200" u="none" cap="none" strike="noStrike">
                 <a:solidFill>
                   <a:srgbClr val="3F3F3F"/>
                 </a:solidFill>
@@ -19407,33 +19778,9 @@
                 <a:cs typeface="Calibri"/>
                 <a:sym typeface="Calibri"/>
               </a:rPr>
-              <a:t>Servicio web para el hotel canino perriot que mejore la eficacia y eficiencia de sus reservas y la </a:t>
+              <a:t>Servicio web para el hotel canino perriot que mejore la eficacia y eficiencia de sus reservas y la gestión del mismo.</a:t>
             </a:r>
-            <a:r>
-              <a:rPr lang="es-419" sz="2200">
-                <a:solidFill>
-                  <a:srgbClr val="3F3F3F"/>
-                </a:solidFill>
-                <a:latin typeface="Calibri"/>
-                <a:ea typeface="Calibri"/>
-                <a:cs typeface="Calibri"/>
-                <a:sym typeface="Calibri"/>
-              </a:rPr>
-              <a:t>gestión</a:t>
-            </a:r>
-            <a:r>
-              <a:rPr lang="es-419" sz="2200">
-                <a:solidFill>
-                  <a:srgbClr val="3F3F3F"/>
-                </a:solidFill>
-                <a:latin typeface="Calibri"/>
-                <a:ea typeface="Calibri"/>
-                <a:cs typeface="Calibri"/>
-                <a:sym typeface="Calibri"/>
-              </a:rPr>
-              <a:t> del mismo.</a:t>
-            </a:r>
-            <a:endParaRPr sz="2200">
+            <a:endParaRPr b="0" i="0" sz="2200" u="none" cap="none" strike="noStrike">
               <a:solidFill>
                 <a:srgbClr val="3F3F3F"/>
               </a:solidFill>
@@ -19514,6 +19861,11 @@
               <a:spcAft>
                 <a:spcPts val="0"/>
               </a:spcAft>
+              <a:buClr>
+                <a:srgbClr val="000000"/>
+              </a:buClr>
+              <a:buSzPts val="1400"/>
+              <a:buFont typeface="Arial"/>
               <a:buNone/>
             </a:pPr>
             <a:r>
@@ -19595,6 +19947,11 @@
               <a:spcAft>
                 <a:spcPts val="0"/>
               </a:spcAft>
+              <a:buClr>
+                <a:srgbClr val="000000"/>
+              </a:buClr>
+              <a:buSzPts val="1400"/>
+              <a:buFont typeface="Arial"/>
               <a:buNone/>
             </a:pPr>
             <a:r>
@@ -19649,6 +20006,11 @@
               <a:spcAft>
                 <a:spcPts val="0"/>
               </a:spcAft>
+              <a:buClr>
+                <a:srgbClr val="000000"/>
+              </a:buClr>
+              <a:buSzPts val="1400"/>
+              <a:buFont typeface="Arial"/>
               <a:buNone/>
             </a:pPr>
             <a:r>
@@ -19701,6 +20063,11 @@
               <a:spcAft>
                 <a:spcPts val="600"/>
               </a:spcAft>
+              <a:buClr>
+                <a:srgbClr val="000000"/>
+              </a:buClr>
+              <a:buSzPts val="2500"/>
+              <a:buFont typeface="Arial"/>
               <a:buNone/>
             </a:pPr>
             <a:r>
@@ -19715,7 +20082,15 @@
               </a:rPr>
               <a:t>Requerimientos de alto nivel</a:t>
             </a:r>
-            <a:endParaRPr/>
+            <a:endParaRPr b="0" i="0" sz="1400" u="none" cap="none" strike="noStrike">
+              <a:solidFill>
+                <a:srgbClr val="000000"/>
+              </a:solidFill>
+              <a:latin typeface="Arial"/>
+              <a:ea typeface="Arial"/>
+              <a:cs typeface="Arial"/>
+              <a:sym typeface="Arial"/>
+            </a:endParaRPr>
           </a:p>
         </p:txBody>
       </p:sp>
@@ -19744,17 +20119,25 @@
           </a:bodyPr>
           <a:lstStyle/>
           <a:p>
-            <a:pPr indent="0" lvl="0" marL="0" rtl="0" algn="l">
-              <a:spcBef>
-                <a:spcPts val="0"/>
-              </a:spcBef>
-              <a:spcAft>
-                <a:spcPts val="0"/>
-              </a:spcAft>
+            <a:pPr indent="0" lvl="0" marL="0" marR="0" rtl="0" algn="l">
+              <a:lnSpc>
+                <a:spcPct val="100000"/>
+              </a:lnSpc>
+              <a:spcBef>
+                <a:spcPts val="0"/>
+              </a:spcBef>
+              <a:spcAft>
+                <a:spcPts val="0"/>
+              </a:spcAft>
+              <a:buClr>
+                <a:srgbClr val="000000"/>
+              </a:buClr>
+              <a:buSzPts val="2600"/>
+              <a:buFont typeface="Arial"/>
               <a:buNone/>
             </a:pPr>
             <a:r>
-              <a:rPr lang="es-419" sz="2600">
+              <a:rPr b="0" i="0" lang="es-419" sz="2600" u="none" cap="none" strike="noStrike">
                 <a:solidFill>
                   <a:schemeClr val="dk1"/>
                 </a:solidFill>
@@ -19763,105 +20146,9 @@
                 <a:cs typeface="Calibri"/>
                 <a:sym typeface="Calibri"/>
               </a:rPr>
-              <a:t>Se espera lograr una </a:t>
+              <a:t>Se espera lograr una página web que permita al usuario agilizar el procedimiento de reserva de su mascota, además de, aumentar la difusión de la empresa Perriot para aumentar los clientes y las ganancias de este servicio.</a:t>
             </a:r>
-            <a:r>
-              <a:rPr lang="es-419" sz="2600">
-                <a:solidFill>
-                  <a:schemeClr val="dk1"/>
-                </a:solidFill>
-                <a:latin typeface="Calibri"/>
-                <a:ea typeface="Calibri"/>
-                <a:cs typeface="Calibri"/>
-                <a:sym typeface="Calibri"/>
-              </a:rPr>
-              <a:t>página</a:t>
-            </a:r>
-            <a:r>
-              <a:rPr lang="es-419" sz="2600">
-                <a:solidFill>
-                  <a:schemeClr val="dk1"/>
-                </a:solidFill>
-                <a:latin typeface="Calibri"/>
-                <a:ea typeface="Calibri"/>
-                <a:cs typeface="Calibri"/>
-                <a:sym typeface="Calibri"/>
-              </a:rPr>
-              <a:t> web que permita al usuario agilizar el procedimiento de reserva de su mascota, </a:t>
-            </a:r>
-            <a:r>
-              <a:rPr lang="es-419" sz="2600">
-                <a:solidFill>
-                  <a:schemeClr val="dk1"/>
-                </a:solidFill>
-                <a:latin typeface="Calibri"/>
-                <a:ea typeface="Calibri"/>
-                <a:cs typeface="Calibri"/>
-                <a:sym typeface="Calibri"/>
-              </a:rPr>
-              <a:t>además</a:t>
-            </a:r>
-            <a:r>
-              <a:rPr lang="es-419" sz="2600">
-                <a:solidFill>
-                  <a:schemeClr val="dk1"/>
-                </a:solidFill>
-                <a:latin typeface="Calibri"/>
-                <a:ea typeface="Calibri"/>
-                <a:cs typeface="Calibri"/>
-                <a:sym typeface="Calibri"/>
-              </a:rPr>
-              <a:t> de, aumentar la </a:t>
-            </a:r>
-            <a:r>
-              <a:rPr lang="es-419" sz="2600">
-                <a:solidFill>
-                  <a:schemeClr val="dk1"/>
-                </a:solidFill>
-                <a:latin typeface="Calibri"/>
-                <a:ea typeface="Calibri"/>
-                <a:cs typeface="Calibri"/>
-                <a:sym typeface="Calibri"/>
-              </a:rPr>
-              <a:t>difusión</a:t>
-            </a:r>
-            <a:r>
-              <a:rPr lang="es-419" sz="2600">
-                <a:solidFill>
-                  <a:schemeClr val="dk1"/>
-                </a:solidFill>
-                <a:latin typeface="Calibri"/>
-                <a:ea typeface="Calibri"/>
-                <a:cs typeface="Calibri"/>
-                <a:sym typeface="Calibri"/>
-              </a:rPr>
-              <a:t> de la empresa </a:t>
-            </a:r>
-            <a:r>
-              <a:rPr lang="es-419" sz="2600">
-                <a:solidFill>
-                  <a:schemeClr val="dk1"/>
-                </a:solidFill>
-                <a:latin typeface="Calibri"/>
-                <a:ea typeface="Calibri"/>
-                <a:cs typeface="Calibri"/>
-                <a:sym typeface="Calibri"/>
-              </a:rPr>
-              <a:t>Perriot</a:t>
-            </a:r>
-            <a:r>
-              <a:rPr lang="es-419" sz="2600">
-                <a:solidFill>
-                  <a:schemeClr val="dk1"/>
-                </a:solidFill>
-                <a:latin typeface="Calibri"/>
-                <a:ea typeface="Calibri"/>
-                <a:cs typeface="Calibri"/>
-                <a:sym typeface="Calibri"/>
-              </a:rPr>
-              <a:t> para aumentar los clientes y las ganancias de este servicio.</a:t>
-            </a:r>
-            <a:endParaRPr sz="2600">
+            <a:endParaRPr b="0" i="0" sz="2600" u="none" cap="none" strike="noStrike">
               <a:solidFill>
                 <a:schemeClr val="dk1"/>
               </a:solidFill>
@@ -19872,17 +20159,25 @@
             </a:endParaRPr>
           </a:p>
           <a:p>
-            <a:pPr indent="0" lvl="0" marL="0" rtl="0" algn="l">
-              <a:spcBef>
-                <a:spcPts val="0"/>
-              </a:spcBef>
-              <a:spcAft>
-                <a:spcPts val="0"/>
-              </a:spcAft>
+            <a:pPr indent="0" lvl="0" marL="0" marR="0" rtl="0" algn="l">
+              <a:lnSpc>
+                <a:spcPct val="100000"/>
+              </a:lnSpc>
+              <a:spcBef>
+                <a:spcPts val="0"/>
+              </a:spcBef>
+              <a:spcAft>
+                <a:spcPts val="0"/>
+              </a:spcAft>
+              <a:buClr>
+                <a:srgbClr val="000000"/>
+              </a:buClr>
+              <a:buSzPts val="2600"/>
+              <a:buFont typeface="Arial"/>
               <a:buNone/>
             </a:pPr>
             <a:r>
-              <a:rPr lang="es-419" sz="2600">
+              <a:rPr b="0" i="0" lang="es-419" sz="2600" u="none" cap="none" strike="noStrike">
                 <a:solidFill>
                   <a:schemeClr val="dk1"/>
                 </a:solidFill>
@@ -19891,57 +20186,9 @@
                 <a:cs typeface="Calibri"/>
                 <a:sym typeface="Calibri"/>
               </a:rPr>
-              <a:t>Para lograrlo se </a:t>
+              <a:t>Para lograrlo se implementará una página web que permita a los usuarios planificar su reserva de antemano sin la necesidad de ir presencialmente.</a:t>
             </a:r>
-            <a:r>
-              <a:rPr lang="es-419" sz="2600">
-                <a:solidFill>
-                  <a:schemeClr val="dk1"/>
-                </a:solidFill>
-                <a:latin typeface="Calibri"/>
-                <a:ea typeface="Calibri"/>
-                <a:cs typeface="Calibri"/>
-                <a:sym typeface="Calibri"/>
-              </a:rPr>
-              <a:t>implementará</a:t>
-            </a:r>
-            <a:r>
-              <a:rPr lang="es-419" sz="2600">
-                <a:solidFill>
-                  <a:schemeClr val="dk1"/>
-                </a:solidFill>
-                <a:latin typeface="Calibri"/>
-                <a:ea typeface="Calibri"/>
-                <a:cs typeface="Calibri"/>
-                <a:sym typeface="Calibri"/>
-              </a:rPr>
-              <a:t> una </a:t>
-            </a:r>
-            <a:r>
-              <a:rPr lang="es-419" sz="2600">
-                <a:solidFill>
-                  <a:schemeClr val="dk1"/>
-                </a:solidFill>
-                <a:latin typeface="Calibri"/>
-                <a:ea typeface="Calibri"/>
-                <a:cs typeface="Calibri"/>
-                <a:sym typeface="Calibri"/>
-              </a:rPr>
-              <a:t>página</a:t>
-            </a:r>
-            <a:r>
-              <a:rPr lang="es-419" sz="2600">
-                <a:solidFill>
-                  <a:schemeClr val="dk1"/>
-                </a:solidFill>
-                <a:latin typeface="Calibri"/>
-                <a:ea typeface="Calibri"/>
-                <a:cs typeface="Calibri"/>
-                <a:sym typeface="Calibri"/>
-              </a:rPr>
-              <a:t> web que permita a los usuarios planificar su reserva de antemano sin la necesidad de ir presencialmente.</a:t>
-            </a:r>
-            <a:endParaRPr sz="2600">
+            <a:endParaRPr b="0" i="0" sz="2600" u="none" cap="none" strike="noStrike">
               <a:solidFill>
                 <a:schemeClr val="dk1"/>
               </a:solidFill>
@@ -20173,7 +20420,7 @@
             <a:tbl>
               <a:tblPr>
                 <a:noFill/>
-                <a:tableStyleId>{240FD805-3509-4F9D-BF3D-3C9AABBD25F3}</a:tableStyleId>
+                <a:tableStyleId>{689214A9-5A22-46FC-940B-F8FDADC3FA68}</a:tableStyleId>
               </a:tblPr>
               <a:tblGrid>
                 <a:gridCol w="2230275"/>
@@ -20267,7 +20514,7 @@
                         <a:buNone/>
                       </a:pPr>
                       <a:r>
-                        <a:rPr lang="es-419"/>
+                        <a:rPr lang="es-419" sz="1400" u="none" cap="none" strike="noStrike"/>
                         <a:t>Usuario Final</a:t>
                       </a:r>
                       <a:endParaRPr sz="1400" u="none" cap="none" strike="noStrike"/>
@@ -20298,7 +20545,7 @@
                         <a:buNone/>
                       </a:pPr>
                       <a:r>
-                        <a:rPr lang="es-419"/>
+                        <a:rPr lang="es-419" sz="1400" u="none" cap="none" strike="noStrike"/>
                         <a:t>Uso del menú del servicio y reservar habitación.</a:t>
                       </a:r>
                       <a:endParaRPr sz="1400" u="none" cap="none" strike="noStrike"/>
@@ -20331,7 +20578,7 @@
                         <a:buNone/>
                       </a:pPr>
                       <a:r>
-                        <a:rPr lang="es-419"/>
+                        <a:rPr lang="es-419" sz="1400" u="none" cap="none" strike="noStrike"/>
                         <a:t>Admin</a:t>
                       </a:r>
                       <a:endParaRPr sz="1400" u="none" cap="none" strike="noStrike"/>
@@ -20362,7 +20609,7 @@
                         <a:buNone/>
                       </a:pPr>
                       <a:r>
-                        <a:rPr lang="es-419"/>
+                        <a:rPr lang="es-419" sz="1400" u="none" cap="none" strike="noStrike"/>
                         <a:t>Gestión de las bases de datos del sistema.</a:t>
                       </a:r>
                       <a:endParaRPr sz="1400" u="none" cap="none" strike="noStrike"/>
@@ -20387,10 +20634,15 @@
                         <a:spcAft>
                           <a:spcPts val="0"/>
                         </a:spcAft>
+                        <a:buClr>
+                          <a:srgbClr val="000000"/>
+                        </a:buClr>
+                        <a:buSzPts val="1400"/>
+                        <a:buFont typeface="Arial"/>
                         <a:buNone/>
                       </a:pPr>
                       <a:r>
-                        <a:rPr lang="es-419"/>
+                        <a:rPr lang="es-419" sz="1400" u="none" cap="none" strike="noStrike"/>
                         <a:t>Recepcionista</a:t>
                       </a:r>
                       <a:endParaRPr sz="1400" u="none" cap="none" strike="noStrike"/>
@@ -20413,10 +20665,15 @@
                         <a:spcAft>
                           <a:spcPts val="0"/>
                         </a:spcAft>
+                        <a:buClr>
+                          <a:srgbClr val="000000"/>
+                        </a:buClr>
+                        <a:buSzPts val="1400"/>
+                        <a:buFont typeface="Arial"/>
                         <a:buNone/>
                       </a:pPr>
                       <a:r>
-                        <a:rPr lang="es-419"/>
+                        <a:rPr lang="es-419" sz="1400" u="none" cap="none" strike="noStrike"/>
                         <a:t>Confirmación comprobante de reserva.</a:t>
                       </a:r>
                       <a:endParaRPr sz="1400" u="none" cap="none" strike="noStrike"/>
@@ -20449,7 +20706,7 @@
                         <a:buNone/>
                       </a:pPr>
                       <a:r>
-                        <a:rPr lang="es-419"/>
+                        <a:rPr lang="es-419" sz="1400" u="none" cap="none" strike="noStrike"/>
                         <a:t>Cuidador</a:t>
                       </a:r>
                       <a:endParaRPr sz="1400" u="none" cap="none" strike="noStrike"/>
@@ -20480,7 +20737,7 @@
                         <a:buNone/>
                       </a:pPr>
                       <a:r>
-                        <a:rPr lang="es-419"/>
+                        <a:rPr lang="es-419" sz="1400" u="none" cap="none" strike="noStrike"/>
                         <a:t>Generar reportes de la mascota.</a:t>
                       </a:r>
                       <a:endParaRPr sz="1400" u="none" cap="none" strike="noStrike"/>
@@ -20562,6 +20819,11 @@
               <a:spcAft>
                 <a:spcPts val="0"/>
               </a:spcAft>
+              <a:buClr>
+                <a:srgbClr val="000000"/>
+              </a:buClr>
+              <a:buSzPts val="1400"/>
+              <a:buFont typeface="Arial"/>
               <a:buNone/>
             </a:pPr>
             <a:r>
@@ -20651,7 +20913,7 @@
           <a:blip r:embed="rId4">
             <a:alphaModFix/>
           </a:blip>
-          <a:srcRect b="10357" l="8305" r="-3" t="17321"/>
+          <a:srcRect b="10356" l="8305" r="-3" t="17321"/>
           <a:stretch/>
         </p:blipFill>
         <p:spPr>
@@ -21066,7 +21328,7 @@
             </a:custGeom>
             <a:solidFill>
               <a:schemeClr val="lt1">
-                <a:alpha val="29803"/>
+                <a:alpha val="29411"/>
               </a:schemeClr>
             </a:solidFill>
             <a:ln>
@@ -21089,6 +21351,11 @@
                 <a:spcAft>
                   <a:spcPts val="0"/>
                 </a:spcAft>
+                <a:buClr>
+                  <a:srgbClr val="000000"/>
+                </a:buClr>
+                <a:buSzPts val="1400"/>
+                <a:buFont typeface="Arial"/>
                 <a:buNone/>
               </a:pPr>
               <a:r>
@@ -21210,7 +21477,7 @@
             </a:custGeom>
             <a:solidFill>
               <a:schemeClr val="lt1">
-                <a:alpha val="29803"/>
+                <a:alpha val="29411"/>
               </a:schemeClr>
             </a:solidFill>
             <a:ln>
@@ -21233,6 +21500,11 @@
                 <a:spcAft>
                   <a:spcPts val="0"/>
                 </a:spcAft>
+                <a:buClr>
+                  <a:srgbClr val="000000"/>
+                </a:buClr>
+                <a:buSzPts val="1400"/>
+                <a:buFont typeface="Arial"/>
                 <a:buNone/>
               </a:pPr>
               <a:r>
@@ -21349,7 +21621,7 @@
             </a:custGeom>
             <a:solidFill>
               <a:schemeClr val="lt1">
-                <a:alpha val="29803"/>
+                <a:alpha val="29411"/>
               </a:schemeClr>
             </a:solidFill>
             <a:ln>
@@ -21372,6 +21644,11 @@
                 <a:spcAft>
                   <a:spcPts val="0"/>
                 </a:spcAft>
+                <a:buClr>
+                  <a:srgbClr val="000000"/>
+                </a:buClr>
+                <a:buSzPts val="1400"/>
+                <a:buFont typeface="Arial"/>
                 <a:buNone/>
               </a:pPr>
               <a:r>
@@ -21779,6 +22056,11 @@
                 <a:spcAft>
                   <a:spcPts val="0"/>
                 </a:spcAft>
+                <a:buClr>
+                  <a:srgbClr val="000000"/>
+                </a:buClr>
+                <a:buSzPts val="1400"/>
+                <a:buFont typeface="Arial"/>
                 <a:buNone/>
               </a:pPr>
               <a:r>
@@ -21927,7 +22209,7 @@
             </a:custGeom>
             <a:solidFill>
               <a:schemeClr val="lt1">
-                <a:alpha val="29803"/>
+                <a:alpha val="29411"/>
               </a:schemeClr>
             </a:solidFill>
             <a:ln>
@@ -21950,6 +22232,11 @@
                 <a:spcAft>
                   <a:spcPts val="0"/>
                 </a:spcAft>
+                <a:buClr>
+                  <a:srgbClr val="000000"/>
+                </a:buClr>
+                <a:buSzPts val="1400"/>
+                <a:buFont typeface="Arial"/>
                 <a:buNone/>
               </a:pPr>
               <a:r>
@@ -22078,7 +22365,7 @@
             </a:custGeom>
             <a:solidFill>
               <a:schemeClr val="lt1">
-                <a:alpha val="29803"/>
+                <a:alpha val="29411"/>
               </a:schemeClr>
             </a:solidFill>
             <a:ln>
@@ -22101,6 +22388,11 @@
                 <a:spcAft>
                   <a:spcPts val="0"/>
                 </a:spcAft>
+                <a:buClr>
+                  <a:srgbClr val="000000"/>
+                </a:buClr>
+                <a:buSzPts val="1400"/>
+                <a:buFont typeface="Arial"/>
                 <a:buNone/>
               </a:pPr>
               <a:r>
@@ -22506,7 +22798,7 @@
             </a:custGeom>
             <a:solidFill>
               <a:schemeClr val="lt1">
-                <a:alpha val="29803"/>
+                <a:alpha val="29411"/>
               </a:schemeClr>
             </a:solidFill>
             <a:ln>
@@ -22529,6 +22821,11 @@
                 <a:spcAft>
                   <a:spcPts val="0"/>
                 </a:spcAft>
+                <a:buClr>
+                  <a:srgbClr val="000000"/>
+                </a:buClr>
+                <a:buSzPts val="1400"/>
+                <a:buFont typeface="Arial"/>
                 <a:buNone/>
               </a:pPr>
               <a:r>
@@ -22662,7 +22959,7 @@
             </a:custGeom>
             <a:solidFill>
               <a:schemeClr val="lt1">
-                <a:alpha val="29803"/>
+                <a:alpha val="29411"/>
               </a:schemeClr>
             </a:solidFill>
             <a:ln>
@@ -22685,6 +22982,11 @@
                 <a:spcAft>
                   <a:spcPts val="0"/>
                 </a:spcAft>
+                <a:buClr>
+                  <a:srgbClr val="000000"/>
+                </a:buClr>
+                <a:buSzPts val="1400"/>
+                <a:buFont typeface="Arial"/>
                 <a:buNone/>
               </a:pPr>
               <a:r>
@@ -22813,7 +23115,7 @@
             </a:custGeom>
             <a:solidFill>
               <a:schemeClr val="lt1">
-                <a:alpha val="29803"/>
+                <a:alpha val="29411"/>
               </a:schemeClr>
             </a:solidFill>
             <a:ln>
@@ -22836,6 +23138,11 @@
                 <a:spcAft>
                   <a:spcPts val="0"/>
                 </a:spcAft>
+                <a:buClr>
+                  <a:srgbClr val="000000"/>
+                </a:buClr>
+                <a:buSzPts val="1400"/>
+                <a:buFont typeface="Arial"/>
                 <a:buNone/>
               </a:pPr>
               <a:r>
@@ -23161,6 +23468,11 @@
                 <a:spcAft>
                   <a:spcPts val="0"/>
                 </a:spcAft>
+                <a:buClr>
+                  <a:srgbClr val="000000"/>
+                </a:buClr>
+                <a:buSzPts val="1400"/>
+                <a:buFont typeface="Arial"/>
                 <a:buNone/>
               </a:pPr>
               <a:r>
@@ -23214,6 +23526,11 @@
               <a:spcAft>
                 <a:spcPts val="0"/>
               </a:spcAft>
+              <a:buClr>
+                <a:srgbClr val="000000"/>
+              </a:buClr>
+              <a:buSzPts val="4400"/>
+              <a:buFont typeface="Arial"/>
               <a:buNone/>
             </a:pPr>
             <a:r>
@@ -23278,13 +23595,12 @@
           <p:cNvPicPr preferRelativeResize="0"/>
           <p:nvPr/>
         </p:nvPicPr>
-        <p:blipFill>
+        <p:blipFill rotWithShape="1">
           <a:blip r:embed="rId3">
             <a:alphaModFix/>
           </a:blip>
-          <a:stretch>
-            <a:fillRect/>
-          </a:stretch>
+          <a:srcRect b="0" l="0" r="0" t="0"/>
+          <a:stretch/>
         </p:blipFill>
         <p:spPr>
           <a:xfrm>
@@ -23321,8 +23637,8 @@
             </a:solidFill>
             <a:prstDash val="solid"/>
             <a:round/>
-            <a:headEnd len="med" w="med" type="none"/>
-            <a:tailEnd len="med" w="med" type="none"/>
+            <a:headEnd len="sm" w="sm" type="none"/>
+            <a:tailEnd len="sm" w="sm" type="none"/>
           </a:ln>
         </p:spPr>
       </p:cxnSp>
@@ -23351,17 +23667,25 @@
           </a:bodyPr>
           <a:lstStyle/>
           <a:p>
-            <a:pPr indent="0" lvl="0" marL="0" rtl="0" algn="l">
-              <a:spcBef>
-                <a:spcPts val="0"/>
-              </a:spcBef>
-              <a:spcAft>
-                <a:spcPts val="0"/>
-              </a:spcAft>
+            <a:pPr indent="0" lvl="0" marL="0" marR="0" rtl="0" algn="l">
+              <a:lnSpc>
+                <a:spcPct val="100000"/>
+              </a:lnSpc>
+              <a:spcBef>
+                <a:spcPts val="0"/>
+              </a:spcBef>
+              <a:spcAft>
+                <a:spcPts val="0"/>
+              </a:spcAft>
+              <a:buClr>
+                <a:srgbClr val="000000"/>
+              </a:buClr>
+              <a:buSzPts val="2800"/>
+              <a:buFont typeface="Arial"/>
               <a:buNone/>
             </a:pPr>
             <a:r>
-              <a:rPr b="1" lang="es-419" sz="2800">
+              <a:rPr b="1" i="0" lang="es-419" sz="2800" u="none" cap="none" strike="noStrike">
                 <a:solidFill>
                   <a:schemeClr val="dk1"/>
                 </a:solidFill>
@@ -23372,7 +23696,7 @@
               </a:rPr>
               <a:t>Diagrama de Casos de uso General</a:t>
             </a:r>
-            <a:endParaRPr b="1" sz="2800">
+            <a:endParaRPr b="1" i="0" sz="2800" u="none" cap="none" strike="noStrike">
               <a:solidFill>
                 <a:schemeClr val="dk1"/>
               </a:solidFill>
@@ -23475,13 +23799,12 @@
           <p:cNvPicPr preferRelativeResize="0"/>
           <p:nvPr/>
         </p:nvPicPr>
-        <p:blipFill>
+        <p:blipFill rotWithShape="1">
           <a:blip r:embed="rId3">
             <a:alphaModFix/>
           </a:blip>
-          <a:stretch>
-            <a:fillRect/>
-          </a:stretch>
+          <a:srcRect b="0" l="0" r="0" t="0"/>
+          <a:stretch/>
         </p:blipFill>
         <p:spPr>
           <a:xfrm>

</xml_diff>